<commit_message>
Update Presentation Draft 1 - 28Apr2019.pptx
</commit_message>
<xml_diff>
--- a/Documents/Presentation Draft 1 - 28Apr2019.pptx
+++ b/Documents/Presentation Draft 1 - 28Apr2019.pptx
@@ -114,6 +114,11 @@
       </a:defRPr>
     </a:lvl9pPr>
   </p:defaultTextStyle>
+  <p:extLst>
+    <p:ext uri="{EFAFB233-063F-42B5-8137-9DF3F51BA10A}">
+      <p15:sldGuideLst xmlns:p15="http://schemas.microsoft.com/office/powerpoint/2012/main"/>
+    </p:ext>
+  </p:extLst>
 </p:presentation>
 </file>
 
@@ -889,7 +894,7 @@
             <a:fld id="{87DE6118-2437-4B30-8E3C-4D2BE6020583}" type="datetimeFigureOut">
               <a:rPr lang="en-US" smtClean="0"/>
               <a:pPr/>
-              <a:t>4/28/2019</a:t>
+              <a:t>4/29/2019</a:t>
             </a:fld>
             <a:endParaRPr lang="en-US" dirty="0"/>
           </a:p>
@@ -1098,7 +1103,7 @@
           <a:p>
             <a:fld id="{87DE6118-2437-4B30-8E3C-4D2BE6020583}" type="datetimeFigureOut">
               <a:rPr lang="en-US" smtClean="0"/>
-              <a:t>4/28/2019</a:t>
+              <a:t>4/29/2019</a:t>
             </a:fld>
             <a:endParaRPr lang="en-US" dirty="0"/>
           </a:p>
@@ -1354,7 +1359,7 @@
           <a:p>
             <a:fld id="{87DE6118-2437-4B30-8E3C-4D2BE6020583}" type="datetimeFigureOut">
               <a:rPr lang="en-US" smtClean="0"/>
-              <a:t>4/28/2019</a:t>
+              <a:t>4/29/2019</a:t>
             </a:fld>
             <a:endParaRPr lang="en-US" dirty="0"/>
           </a:p>
@@ -1524,7 +1529,7 @@
           <a:p>
             <a:fld id="{87DE6118-2437-4B30-8E3C-4D2BE6020583}" type="datetimeFigureOut">
               <a:rPr lang="en-US" smtClean="0"/>
-              <a:t>4/28/2019</a:t>
+              <a:t>4/29/2019</a:t>
             </a:fld>
             <a:endParaRPr lang="en-US" dirty="0"/>
           </a:p>
@@ -1868,7 +1873,7 @@
             <a:fld id="{87DE6118-2437-4B30-8E3C-4D2BE6020583}" type="datetimeFigureOut">
               <a:rPr lang="en-US" smtClean="0"/>
               <a:pPr/>
-              <a:t>4/28/2019</a:t>
+              <a:t>4/29/2019</a:t>
             </a:fld>
             <a:endParaRPr lang="en-US" dirty="0"/>
           </a:p>
@@ -2144,7 +2149,7 @@
           <a:p>
             <a:fld id="{87DE6118-2437-4B30-8E3C-4D2BE6020583}" type="datetimeFigureOut">
               <a:rPr lang="en-US" smtClean="0"/>
-              <a:t>4/28/2019</a:t>
+              <a:t>4/29/2019</a:t>
             </a:fld>
             <a:endParaRPr lang="en-US" dirty="0"/>
           </a:p>
@@ -2523,7 +2528,7 @@
           <a:p>
             <a:fld id="{87DE6118-2437-4B30-8E3C-4D2BE6020583}" type="datetimeFigureOut">
               <a:rPr lang="en-US" smtClean="0"/>
-              <a:t>4/28/2019</a:t>
+              <a:t>4/29/2019</a:t>
             </a:fld>
             <a:endParaRPr lang="en-US" dirty="0"/>
           </a:p>
@@ -2641,7 +2646,7 @@
           <a:p>
             <a:fld id="{87DE6118-2437-4B30-8E3C-4D2BE6020583}" type="datetimeFigureOut">
               <a:rPr lang="en-US" smtClean="0"/>
-              <a:t>4/28/2019</a:t>
+              <a:t>4/29/2019</a:t>
             </a:fld>
             <a:endParaRPr lang="en-US" dirty="0"/>
           </a:p>
@@ -2812,7 +2817,7 @@
           <a:p>
             <a:fld id="{87DE6118-2437-4B30-8E3C-4D2BE6020583}" type="datetimeFigureOut">
               <a:rPr lang="en-US" smtClean="0"/>
-              <a:t>4/28/2019</a:t>
+              <a:t>4/29/2019</a:t>
             </a:fld>
             <a:endParaRPr lang="en-US" dirty="0"/>
           </a:p>
@@ -3167,7 +3172,7 @@
             <a:fld id="{87DE6118-2437-4B30-8E3C-4D2BE6020583}" type="datetimeFigureOut">
               <a:rPr lang="en-US" smtClean="0"/>
               <a:pPr/>
-              <a:t>4/28/2019</a:t>
+              <a:t>4/29/2019</a:t>
             </a:fld>
             <a:endParaRPr lang="en-US" dirty="0"/>
           </a:p>
@@ -3546,7 +3551,7 @@
             <a:fld id="{87DE6118-2437-4B30-8E3C-4D2BE6020583}" type="datetimeFigureOut">
               <a:rPr lang="en-US" smtClean="0"/>
               <a:pPr/>
-              <a:t>4/28/2019</a:t>
+              <a:t>4/29/2019</a:t>
             </a:fld>
             <a:endParaRPr lang="en-US" dirty="0"/>
           </a:p>
@@ -3835,7 +3840,7 @@
             <a:fld id="{87DE6118-2437-4B30-8E3C-4D2BE6020583}" type="datetimeFigureOut">
               <a:rPr lang="en-US" smtClean="0"/>
               <a:pPr/>
-              <a:t>4/28/2019</a:t>
+              <a:t>4/29/2019</a:t>
             </a:fld>
             <a:endParaRPr lang="en-US" dirty="0"/>
           </a:p>
@@ -6374,9 +6379,16 @@
             <p:ph idx="1"/>
           </p:nvPr>
         </p:nvSpPr>
-        <p:spPr/>
-        <p:txBody>
-          <a:bodyPr/>
+        <p:spPr>
+          <a:xfrm>
+            <a:off x="1097280" y="1845733"/>
+            <a:ext cx="10058400" cy="4225457"/>
+          </a:xfrm>
+        </p:spPr>
+        <p:txBody>
+          <a:bodyPr>
+            <a:normAutofit fontScale="92500" lnSpcReduction="10000"/>
+          </a:bodyPr>
           <a:lstStyle/>
           <a:p>
             <a:r>
@@ -6393,11 +6405,67 @@
           <a:p>
             <a:r>
               <a:rPr lang="en-GB" dirty="0"/>
-              <a:t>Team worked well together – workload evenly distributed, everybody flexible and helpful, stress managed, pragmatic approach</a:t>
-            </a:r>
-          </a:p>
-          <a:p>
-            <a:endParaRPr lang="en-GB" dirty="0"/>
+              <a:t>Team worked well together </a:t>
+            </a:r>
+          </a:p>
+          <a:p>
+            <a:pPr lvl="1"/>
+            <a:r>
+              <a:rPr lang="en-GB" dirty="0"/>
+              <a:t>Workload evenly distributed</a:t>
+            </a:r>
+          </a:p>
+          <a:p>
+            <a:pPr lvl="1"/>
+            <a:r>
+              <a:rPr lang="en-GB" dirty="0"/>
+              <a:t>Everybody flexible, understanding, listening and helpful</a:t>
+            </a:r>
+          </a:p>
+          <a:p>
+            <a:pPr lvl="1"/>
+            <a:r>
+              <a:rPr lang="en-GB" dirty="0"/>
+              <a:t>Stress managed</a:t>
+            </a:r>
+          </a:p>
+          <a:p>
+            <a:pPr lvl="1"/>
+            <a:r>
+              <a:rPr lang="en-GB" dirty="0"/>
+              <a:t>Pragmatic approach – got on with it</a:t>
+            </a:r>
+          </a:p>
+          <a:p>
+            <a:pPr lvl="1"/>
+            <a:r>
+              <a:rPr lang="en-GB" dirty="0"/>
+              <a:t>Everyone was reliable</a:t>
+            </a:r>
+          </a:p>
+          <a:p>
+            <a:r>
+              <a:rPr lang="en-GB" dirty="0"/>
+              <a:t>Limited hangout time, more action less talking</a:t>
+            </a:r>
+          </a:p>
+          <a:p>
+            <a:r>
+              <a:rPr lang="en-GB" dirty="0"/>
+              <a:t>Commitment to Trello – tracking what’s being done, by who, when</a:t>
+            </a:r>
+          </a:p>
+          <a:p>
+            <a:r>
+              <a:rPr lang="en-GB" dirty="0"/>
+              <a:t>Organisation and prioritisation – smooth flow of project</a:t>
+            </a:r>
+          </a:p>
+          <a:p>
+            <a:r>
+              <a:rPr lang="en-GB" dirty="0"/>
+              <a:t>How quickly we grasped MVC</a:t>
+            </a:r>
           </a:p>
         </p:txBody>
       </p:sp>
@@ -6486,7 +6554,13 @@
             </a:r>
             <a:r>
               <a:rPr lang="en-GB" dirty="0"/>
-              <a:t> working from India – heat and different time differences</a:t>
+              <a:t> working from India (due to family situation) – heat and different time differences</a:t>
+            </a:r>
+          </a:p>
+          <a:p>
+            <a:r>
+              <a:rPr lang="en-GB" dirty="0"/>
+              <a:t>Health issues</a:t>
             </a:r>
           </a:p>
           <a:p>
@@ -6498,6 +6572,12 @@
           <a:p>
             <a:r>
               <a:rPr lang="en-GB" dirty="0"/>
+              <a:t>Ash not hearing people on hangouts :P</a:t>
+            </a:r>
+          </a:p>
+          <a:p>
+            <a:r>
+              <a:rPr lang="en-GB" dirty="0"/>
               <a:t>Team getting the hang of GitHub – using branches, managing conflicts, terminal vs Desktop</a:t>
             </a:r>
           </a:p>
@@ -6508,7 +6588,30 @@
             </a:r>
           </a:p>
           <a:p>
-            <a:endParaRPr lang="en-GB" dirty="0"/>
+            <a:r>
+              <a:rPr lang="en-GB" dirty="0"/>
+              <a:t>Learning on the job – trying and testing as we went</a:t>
+            </a:r>
+          </a:p>
+          <a:p>
+            <a:r>
+              <a:rPr lang="en-GB" dirty="0"/>
+              <a:t>Slower with CSS/HTML/</a:t>
+            </a:r>
+            <a:r>
+              <a:rPr lang="en-GB" dirty="0" err="1"/>
+              <a:t>Javascript</a:t>
+            </a:r>
+            <a:r>
+              <a:rPr lang="en-GB" dirty="0"/>
+              <a:t> than PHP</a:t>
+            </a:r>
+          </a:p>
+          <a:p>
+            <a:r>
+              <a:rPr lang="en-GB" dirty="0"/>
+              <a:t>Balancing life/family/commitments as well</a:t>
+            </a:r>
           </a:p>
         </p:txBody>
       </p:sp>
@@ -6596,6 +6699,20 @@
               <a:t>Could we have done anything better? Perhaps could have mapped out styling a bit more beforehand so that we had consistency from the start rather than trying to make it all fit at the end?</a:t>
             </a:r>
           </a:p>
+          <a:p>
+            <a:r>
+              <a:rPr lang="en-GB" dirty="0"/>
+              <a:t>All done the same method of </a:t>
+            </a:r>
+            <a:r>
+              <a:rPr lang="en-GB" dirty="0" err="1"/>
+              <a:t>github</a:t>
+            </a:r>
+            <a:endParaRPr lang="en-GB" dirty="0"/>
+          </a:p>
+          <a:p>
+            <a:endParaRPr lang="en-GB" dirty="0"/>
+          </a:p>
         </p:txBody>
       </p:sp>
     </p:spTree>
@@ -6698,7 +6815,7 @@
             <a:pPr lvl="1"/>
             <a:r>
               <a:rPr lang="en-GB" dirty="0"/>
-              <a:t>Capacity to incorporate twitter and Instagram feeds</a:t>
+              <a:t>Capacity to incorporate Twitter and Instagram feeds</a:t>
             </a:r>
           </a:p>
           <a:p>
@@ -6721,6 +6838,17 @@
               <a:rPr lang="en-GB" dirty="0"/>
               <a:t>Considering accessibility for differently-abled people</a:t>
             </a:r>
+          </a:p>
+          <a:p>
+            <a:pPr lvl="1"/>
+            <a:r>
+              <a:rPr lang="en-GB" dirty="0"/>
+              <a:t>Support for other languages</a:t>
+            </a:r>
+          </a:p>
+          <a:p>
+            <a:pPr lvl="1"/>
+            <a:endParaRPr lang="en-GB" dirty="0"/>
           </a:p>
         </p:txBody>
       </p:sp>

</xml_diff>